<commit_message>
Added 'Key Ideas' slides
</commit_message>
<xml_diff>
--- a/03 Integers.pptx
+++ b/03 Integers.pptx
@@ -5,7 +5,7 @@
     <p:sldMasterId id="2147483648" r:id="rId1"/>
   </p:sldMasterIdLst>
   <p:notesMasterIdLst>
-    <p:notesMasterId r:id="rId56"/>
+    <p:notesMasterId r:id="rId57"/>
   </p:notesMasterIdLst>
   <p:sldIdLst>
     <p:sldId id="256" r:id="rId2"/>
@@ -62,6 +62,7 @@
     <p:sldId id="398" r:id="rId53"/>
     <p:sldId id="399" r:id="rId54"/>
     <p:sldId id="411" r:id="rId55"/>
+    <p:sldId id="412" r:id="rId56"/>
   </p:sldIdLst>
   <p:sldSz cx="12192000" cy="6858000"/>
   <p:notesSz cx="6858000" cy="9144000"/>
@@ -250,7 +251,7 @@
           <a:p>
             <a:fld id="{F22450E9-715D-42D8-9747-C0402EEB663B}" type="datetimeFigureOut">
               <a:rPr lang="en-US" smtClean="0"/>
-              <a:t>5/22/21</a:t>
+              <a:t>5/29/21</a:t>
             </a:fld>
             <a:endParaRPr lang="en-US"/>
           </a:p>
@@ -3782,7 +3783,7 @@
           <a:p>
             <a:fld id="{59E6F902-31B0-C749-B955-5A3E4D8260BA}" type="datetime1">
               <a:rPr lang="en-US" smtClean="0"/>
-              <a:t>5/22/21</a:t>
+              <a:t>5/29/21</a:t>
             </a:fld>
             <a:endParaRPr lang="en-US"/>
           </a:p>
@@ -3954,7 +3955,7 @@
           <a:p>
             <a:fld id="{9FF23D98-3510-7245-86CD-59E60D1657F9}" type="datetime1">
               <a:rPr lang="en-US" smtClean="0"/>
-              <a:t>5/22/21</a:t>
+              <a:t>5/29/21</a:t>
             </a:fld>
             <a:endParaRPr lang="en-US"/>
           </a:p>
@@ -4218,7 +4219,7 @@
           <a:p>
             <a:fld id="{3EAFC5AE-625B-5448-A323-7375037ACA0A}" type="datetime1">
               <a:rPr lang="en-US" smtClean="0"/>
-              <a:t>5/22/21</a:t>
+              <a:t>5/29/21</a:t>
             </a:fld>
             <a:endParaRPr lang="en-US"/>
           </a:p>
@@ -4615,7 +4616,7 @@
           <a:p>
             <a:fld id="{4D7DC098-65A3-4C4E-B095-AF27D03BB041}" type="datetime1">
               <a:rPr lang="en-US" smtClean="0"/>
-              <a:t>5/22/21</a:t>
+              <a:t>5/29/21</a:t>
             </a:fld>
             <a:endParaRPr lang="en-US"/>
           </a:p>
@@ -5034,7 +5035,7 @@
           <a:p>
             <a:fld id="{47690363-2B5E-EF47-A323-2A6A6AC3C0A6}" type="datetime1">
               <a:rPr lang="en-US" smtClean="0"/>
-              <a:t>5/22/21</a:t>
+              <a:t>5/29/21</a:t>
             </a:fld>
             <a:endParaRPr lang="en-US"/>
           </a:p>
@@ -5206,7 +5207,7 @@
           <a:p>
             <a:fld id="{48BCE32E-CD4C-2645-AF16-A48AEDD1FD4A}" type="datetime1">
               <a:rPr lang="en-US" smtClean="0"/>
-              <a:t>5/22/21</a:t>
+              <a:t>5/29/21</a:t>
             </a:fld>
             <a:endParaRPr lang="en-US"/>
           </a:p>
@@ -5356,7 +5357,7 @@
           <a:p>
             <a:fld id="{4AE1833B-C2DE-EF47-B853-9071570580B9}" type="datetime1">
               <a:rPr lang="en-US" smtClean="0"/>
-              <a:t>5/22/21</a:t>
+              <a:t>5/29/21</a:t>
             </a:fld>
             <a:endParaRPr lang="en-US"/>
           </a:p>
@@ -5686,7 +5687,7 @@
           <a:p>
             <a:fld id="{C7F1707C-5FA0-3C4B-BD19-4F2693455920}" type="datetime1">
               <a:rPr lang="en-US" smtClean="0"/>
-              <a:t>5/22/21</a:t>
+              <a:t>5/29/21</a:t>
             </a:fld>
             <a:endParaRPr lang="en-US"/>
           </a:p>
@@ -5993,7 +5994,7 @@
           <a:p>
             <a:fld id="{7C5F269E-5328-244F-B514-1780FC037411}" type="datetime1">
               <a:rPr lang="en-US" smtClean="0"/>
-              <a:t>5/22/21</a:t>
+              <a:t>5/29/21</a:t>
             </a:fld>
             <a:endParaRPr lang="en-US"/>
           </a:p>
@@ -6448,7 +6449,7 @@
           <a:p>
             <a:fld id="{46C38DEB-2EDB-D742-8978-732BE86CF6BF}" type="datetime1">
               <a:rPr lang="en-US" smtClean="0"/>
-              <a:t>5/22/21</a:t>
+              <a:t>5/29/21</a:t>
             </a:fld>
             <a:endParaRPr lang="en-US"/>
           </a:p>
@@ -54487,6 +54488,419 @@
 </p:sld>
 </file>
 
+<file path=ppt/slides/slide55.xml><?xml version="1.0" encoding="utf-8"?>
+<p:sld xmlns:a="http://schemas.openxmlformats.org/drawingml/2006/main" xmlns:r="http://schemas.openxmlformats.org/officeDocument/2006/relationships" xmlns:p="http://schemas.openxmlformats.org/presentationml/2006/main">
+  <p:cSld>
+    <p:spTree>
+      <p:nvGrpSpPr>
+        <p:cNvPr id="1" name=""/>
+        <p:cNvGrpSpPr/>
+        <p:nvPr/>
+      </p:nvGrpSpPr>
+      <p:grpSpPr>
+        <a:xfrm>
+          <a:off x="0" y="0"/>
+          <a:ext cx="0" cy="0"/>
+          <a:chOff x="0" y="0"/>
+          <a:chExt cx="0" cy="0"/>
+        </a:xfrm>
+      </p:grpSpPr>
+      <p:sp>
+        <p:nvSpPr>
+          <p:cNvPr id="8" name="Rectangle 7">
+            <a:extLst>
+              <a:ext uri="{FF2B5EF4-FFF2-40B4-BE49-F238E27FC236}">
+                <a16:creationId xmlns:a16="http://schemas.microsoft.com/office/drawing/2014/main" id="{036AB5FA-8873-6041-88EA-59D156764133}"/>
+              </a:ext>
+            </a:extLst>
+          </p:cNvPr>
+          <p:cNvSpPr/>
+          <p:nvPr/>
+        </p:nvSpPr>
+        <p:spPr>
+          <a:xfrm>
+            <a:off x="-1" y="0"/>
+            <a:ext cx="12192001" cy="6858000"/>
+          </a:xfrm>
+          <a:prstGeom prst="rect">
+            <a:avLst/>
+          </a:prstGeom>
+          <a:solidFill>
+            <a:srgbClr val="002060"/>
+          </a:solidFill>
+          <a:ln>
+            <a:solidFill>
+              <a:srgbClr val="002060"/>
+            </a:solidFill>
+          </a:ln>
+        </p:spPr>
+        <p:style>
+          <a:lnRef idx="2">
+            <a:schemeClr val="accent1">
+              <a:shade val="50000"/>
+            </a:schemeClr>
+          </a:lnRef>
+          <a:fillRef idx="1">
+            <a:schemeClr val="accent1"/>
+          </a:fillRef>
+          <a:effectRef idx="0">
+            <a:schemeClr val="accent1"/>
+          </a:effectRef>
+          <a:fontRef idx="minor">
+            <a:schemeClr val="lt1"/>
+          </a:fontRef>
+        </p:style>
+        <p:txBody>
+          <a:bodyPr rtlCol="0" anchor="ctr"/>
+          <a:lstStyle/>
+          <a:p>
+            <a:pPr algn="ctr"/>
+            <a:endParaRPr lang="en-US"/>
+          </a:p>
+        </p:txBody>
+      </p:sp>
+      <p:sp>
+        <p:nvSpPr>
+          <p:cNvPr id="6" name="Rectangle 5">
+            <a:extLst>
+              <a:ext uri="{FF2B5EF4-FFF2-40B4-BE49-F238E27FC236}">
+                <a16:creationId xmlns:a16="http://schemas.microsoft.com/office/drawing/2014/main" id="{99E72841-F851-694E-8244-382959B6D12F}"/>
+              </a:ext>
+            </a:extLst>
+          </p:cNvPr>
+          <p:cNvSpPr/>
+          <p:nvPr/>
+        </p:nvSpPr>
+        <p:spPr>
+          <a:xfrm>
+            <a:off x="0" y="0"/>
+            <a:ext cx="12192000" cy="6858000"/>
+          </a:xfrm>
+          <a:prstGeom prst="rect">
+            <a:avLst/>
+          </a:prstGeom>
+          <a:blipFill dpi="0" rotWithShape="1">
+            <a:blip r:embed="rId2">
+              <a:alphaModFix amt="32660"/>
+              <a:extLst>
+                <a:ext uri="{28A0092B-C50C-407E-A947-70E740481C1C}">
+                  <a14:useLocalDpi xmlns:a14="http://schemas.microsoft.com/office/drawing/2010/main" val="0"/>
+                </a:ext>
+              </a:extLst>
+            </a:blip>
+            <a:srcRect/>
+            <a:stretch>
+              <a:fillRect/>
+            </a:stretch>
+          </a:blipFill>
+          <a:ln>
+            <a:noFill/>
+          </a:ln>
+        </p:spPr>
+        <p:style>
+          <a:lnRef idx="2">
+            <a:schemeClr val="accent1">
+              <a:shade val="50000"/>
+            </a:schemeClr>
+          </a:lnRef>
+          <a:fillRef idx="1">
+            <a:schemeClr val="accent1"/>
+          </a:fillRef>
+          <a:effectRef idx="0">
+            <a:schemeClr val="accent1"/>
+          </a:effectRef>
+          <a:fontRef idx="minor">
+            <a:schemeClr val="lt1"/>
+          </a:fontRef>
+        </p:style>
+        <p:txBody>
+          <a:bodyPr rtlCol="0" anchor="ctr"/>
+          <a:lstStyle/>
+          <a:p>
+            <a:pPr algn="ctr"/>
+            <a:endParaRPr lang="en-US"/>
+          </a:p>
+        </p:txBody>
+      </p:sp>
+      <p:sp>
+        <p:nvSpPr>
+          <p:cNvPr id="2" name="Title 1">
+            <a:extLst>
+              <a:ext uri="{FF2B5EF4-FFF2-40B4-BE49-F238E27FC236}">
+                <a16:creationId xmlns:a16="http://schemas.microsoft.com/office/drawing/2014/main" id="{00A3F080-9636-8A4F-8A7D-DC5EE1546B2D}"/>
+              </a:ext>
+            </a:extLst>
+          </p:cNvPr>
+          <p:cNvSpPr>
+            <a:spLocks noGrp="1"/>
+          </p:cNvSpPr>
+          <p:nvPr>
+            <p:ph type="title"/>
+          </p:nvPr>
+        </p:nvSpPr>
+        <p:spPr/>
+        <p:txBody>
+          <a:bodyPr/>
+          <a:lstStyle/>
+          <a:p>
+            <a:r>
+              <a:rPr lang="en-US" dirty="0">
+                <a:solidFill>
+                  <a:srgbClr val="FFFF00"/>
+                </a:solidFill>
+              </a:rPr>
+              <a:t>Key Ideas</a:t>
+            </a:r>
+          </a:p>
+        </p:txBody>
+      </p:sp>
+      <p:sp>
+        <p:nvSpPr>
+          <p:cNvPr id="7" name="Content Placeholder 6">
+            <a:extLst>
+              <a:ext uri="{FF2B5EF4-FFF2-40B4-BE49-F238E27FC236}">
+                <a16:creationId xmlns:a16="http://schemas.microsoft.com/office/drawing/2014/main" id="{6EC673D7-A525-BA44-B1BF-7A6E360EB906}"/>
+              </a:ext>
+            </a:extLst>
+          </p:cNvPr>
+          <p:cNvSpPr>
+            <a:spLocks noGrp="1"/>
+          </p:cNvSpPr>
+          <p:nvPr>
+            <p:ph idx="1"/>
+          </p:nvPr>
+        </p:nvSpPr>
+        <p:spPr>
+          <a:xfrm>
+            <a:off x="838200" y="1825624"/>
+            <a:ext cx="10515600" cy="4828674"/>
+          </a:xfrm>
+        </p:spPr>
+        <p:txBody>
+          <a:bodyPr>
+            <a:normAutofit/>
+          </a:bodyPr>
+          <a:lstStyle/>
+          <a:p>
+            <a:r>
+              <a:rPr lang="en-US" dirty="0">
+                <a:solidFill>
+                  <a:srgbClr val="FFFF00"/>
+                </a:solidFill>
+              </a:rPr>
+              <a:t>Signed vs unsigned integers</a:t>
+            </a:r>
+          </a:p>
+          <a:p>
+            <a:r>
+              <a:rPr lang="en-US" dirty="0">
+                <a:solidFill>
+                  <a:srgbClr val="FFFF00"/>
+                </a:solidFill>
+              </a:rPr>
+              <a:t>MSB is sign bit (for signed integers)</a:t>
+            </a:r>
+          </a:p>
+          <a:p>
+            <a:r>
+              <a:rPr lang="en-US" dirty="0">
+                <a:solidFill>
+                  <a:srgbClr val="FFFF00"/>
+                </a:solidFill>
+              </a:rPr>
+              <a:t>Unsigned integer overflow, signed integer overflow</a:t>
+            </a:r>
+          </a:p>
+          <a:p>
+            <a:r>
+              <a:rPr lang="en-US" dirty="0">
+                <a:solidFill>
+                  <a:srgbClr val="FFFF00"/>
+                </a:solidFill>
+              </a:rPr>
+              <a:t>Given </a:t>
+            </a:r>
+            <a:r>
+              <a:rPr lang="en-US" i="1" dirty="0">
+                <a:solidFill>
+                  <a:srgbClr val="FFFF00"/>
+                </a:solidFill>
+              </a:rPr>
+              <a:t>x</a:t>
+            </a:r>
+            <a:r>
+              <a:rPr lang="en-US" dirty="0">
+                <a:solidFill>
+                  <a:srgbClr val="FFFF00"/>
+                </a:solidFill>
+              </a:rPr>
+              <a:t>, negate </a:t>
+            </a:r>
+            <a:r>
+              <a:rPr lang="en-US" i="1" dirty="0">
+                <a:solidFill>
+                  <a:srgbClr val="FFFF00"/>
+                </a:solidFill>
+              </a:rPr>
+              <a:t>x</a:t>
+            </a:r>
+            <a:r>
+              <a:rPr lang="en-US" dirty="0">
+                <a:solidFill>
+                  <a:srgbClr val="FFFF00"/>
+                </a:solidFill>
+              </a:rPr>
+              <a:t> and add 1 to get bit pattern for -</a:t>
+            </a:r>
+            <a:r>
+              <a:rPr lang="en-US" i="1" dirty="0">
+                <a:solidFill>
+                  <a:srgbClr val="FFFF00"/>
+                </a:solidFill>
+              </a:rPr>
+              <a:t>x</a:t>
+            </a:r>
+            <a:r>
+              <a:rPr lang="en-US" dirty="0">
+                <a:solidFill>
+                  <a:srgbClr val="FFFF00"/>
+                </a:solidFill>
+              </a:rPr>
+              <a:t> </a:t>
+            </a:r>
+          </a:p>
+          <a:p>
+            <a:r>
+              <a:rPr lang="en-US" dirty="0">
+                <a:solidFill>
+                  <a:srgbClr val="FFFF00"/>
+                </a:solidFill>
+              </a:rPr>
+              <a:t>Casting between integer types</a:t>
+            </a:r>
+          </a:p>
+          <a:p>
+            <a:r>
+              <a:rPr lang="en-US" dirty="0">
+                <a:solidFill>
+                  <a:srgbClr val="FFFF00"/>
+                </a:solidFill>
+              </a:rPr>
+              <a:t>Integer arithmetic</a:t>
+            </a:r>
+          </a:p>
+          <a:p>
+            <a:pPr lvl="1"/>
+            <a:r>
+              <a:rPr lang="en-US" dirty="0">
+                <a:solidFill>
+                  <a:srgbClr val="FFFF00"/>
+                </a:solidFill>
+              </a:rPr>
+              <a:t>Ripple-carry adder</a:t>
+            </a:r>
+          </a:p>
+        </p:txBody>
+      </p:sp>
+      <p:sp>
+        <p:nvSpPr>
+          <p:cNvPr id="3" name="Footer Placeholder 2">
+            <a:extLst>
+              <a:ext uri="{FF2B5EF4-FFF2-40B4-BE49-F238E27FC236}">
+                <a16:creationId xmlns:a16="http://schemas.microsoft.com/office/drawing/2014/main" id="{2C15EE23-D7C1-5D4A-9A69-3FDEC1DC6D57}"/>
+              </a:ext>
+            </a:extLst>
+          </p:cNvPr>
+          <p:cNvSpPr>
+            <a:spLocks noGrp="1"/>
+          </p:cNvSpPr>
+          <p:nvPr>
+            <p:ph type="ftr" sz="quarter" idx="11"/>
+          </p:nvPr>
+        </p:nvSpPr>
+        <p:spPr/>
+        <p:txBody>
+          <a:bodyPr/>
+          <a:lstStyle/>
+          <a:p>
+            <a:r>
+              <a:rPr lang="en-US"/>
+              <a:t>Programming at the Hardware/Software Interface</a:t>
+            </a:r>
+            <a:endParaRPr lang="en-US" dirty="0"/>
+          </a:p>
+        </p:txBody>
+      </p:sp>
+      <p:sp>
+        <p:nvSpPr>
+          <p:cNvPr id="4" name="Slide Number Placeholder 3">
+            <a:extLst>
+              <a:ext uri="{FF2B5EF4-FFF2-40B4-BE49-F238E27FC236}">
+                <a16:creationId xmlns:a16="http://schemas.microsoft.com/office/drawing/2014/main" id="{FCABED9D-231A-B646-AAE2-DD1BA9075786}"/>
+              </a:ext>
+            </a:extLst>
+          </p:cNvPr>
+          <p:cNvSpPr>
+            <a:spLocks noGrp="1"/>
+          </p:cNvSpPr>
+          <p:nvPr>
+            <p:ph type="sldNum" sz="quarter" idx="12"/>
+          </p:nvPr>
+        </p:nvSpPr>
+        <p:spPr/>
+        <p:txBody>
+          <a:bodyPr/>
+          <a:lstStyle/>
+          <a:p>
+            <a:fld id="{B30C84D9-7A41-4FEB-892B-80917372DB87}" type="slidenum">
+              <a:rPr lang="en-US" smtClean="0"/>
+              <a:t>55</a:t>
+            </a:fld>
+            <a:endParaRPr lang="en-US"/>
+          </a:p>
+        </p:txBody>
+      </p:sp>
+      <p:sp>
+        <p:nvSpPr>
+          <p:cNvPr id="5" name="Text Placeholder 4">
+            <a:extLst>
+              <a:ext uri="{FF2B5EF4-FFF2-40B4-BE49-F238E27FC236}">
+                <a16:creationId xmlns:a16="http://schemas.microsoft.com/office/drawing/2014/main" id="{73990C29-A431-614B-AA09-1E0593CDD5D8}"/>
+              </a:ext>
+            </a:extLst>
+          </p:cNvPr>
+          <p:cNvSpPr>
+            <a:spLocks noGrp="1"/>
+          </p:cNvSpPr>
+          <p:nvPr>
+            <p:ph type="body" sz="quarter" idx="13"/>
+          </p:nvPr>
+        </p:nvSpPr>
+        <p:spPr/>
+        <p:txBody>
+          <a:bodyPr/>
+          <a:lstStyle/>
+          <a:p>
+            <a:r>
+              <a:rPr lang="en-US" dirty="0"/>
+              <a:t>Slide by Bohn</a:t>
+            </a:r>
+          </a:p>
+        </p:txBody>
+      </p:sp>
+    </p:spTree>
+    <p:extLst>
+      <p:ext uri="{BB962C8B-B14F-4D97-AF65-F5344CB8AC3E}">
+        <p14:creationId xmlns:p14="http://schemas.microsoft.com/office/powerpoint/2010/main" val="2860074888"/>
+      </p:ext>
+    </p:extLst>
+  </p:cSld>
+  <p:clrMapOvr>
+    <a:masterClrMapping/>
+  </p:clrMapOvr>
+</p:sld>
+</file>
+
 <file path=ppt/slides/slide6.xml><?xml version="1.0" encoding="utf-8"?>
 <p:sld xmlns:a="http://schemas.openxmlformats.org/drawingml/2006/main" xmlns:r="http://schemas.openxmlformats.org/officeDocument/2006/relationships" xmlns:p="http://schemas.openxmlformats.org/presentationml/2006/main">
   <p:cSld>

</xml_diff>